<commit_message>
Updated pres with flagged map. Updated donut image with better pointers.
</commit_message>
<xml_diff>
--- a/Carter/Project 2 Presentation 10-29-2018.pptx
+++ b/Carter/Project 2 Presentation 10-29-2018.pptx
@@ -5,7 +5,7 @@
     <p:sldMasterId id="2147483689" r:id="rId1"/>
   </p:sldMasterIdLst>
   <p:notesMasterIdLst>
-    <p:notesMasterId r:id="rId13"/>
+    <p:notesMasterId r:id="rId14"/>
   </p:notesMasterIdLst>
   <p:sldIdLst>
     <p:sldId id="256" r:id="rId2"/>
@@ -16,9 +16,10 @@
     <p:sldId id="280" r:id="rId7"/>
     <p:sldId id="279" r:id="rId8"/>
     <p:sldId id="281" r:id="rId9"/>
-    <p:sldId id="282" r:id="rId10"/>
-    <p:sldId id="283" r:id="rId11"/>
-    <p:sldId id="284" r:id="rId12"/>
+    <p:sldId id="285" r:id="rId10"/>
+    <p:sldId id="282" r:id="rId11"/>
+    <p:sldId id="283" r:id="rId12"/>
+    <p:sldId id="284" r:id="rId13"/>
   </p:sldIdLst>
   <p:sldSz cx="12192000" cy="6858000"/>
   <p:notesSz cx="6858000" cy="9144000"/>
@@ -219,7 +220,7 @@
           <a:p>
             <a:fld id="{F6F9B6C9-9DF1-4394-BC16-4F555A4B3822}" type="datetimeFigureOut">
               <a:rPr lang="en-US" smtClean="0"/>
-              <a:t>10/29/2018</a:t>
+              <a:t>10/30/2018</a:t>
             </a:fld>
             <a:endParaRPr lang="en-US"/>
           </a:p>
@@ -880,7 +881,7 @@
           <a:p>
             <a:fld id="{1E1E479D-5F8C-4919-ACB4-332E378273DA}" type="datetimeFigureOut">
               <a:rPr lang="en-US" smtClean="0"/>
-              <a:t>10/29/2018</a:t>
+              <a:t>10/30/2018</a:t>
             </a:fld>
             <a:endParaRPr lang="en-US"/>
           </a:p>
@@ -1088,7 +1089,7 @@
           <a:p>
             <a:fld id="{1E1E479D-5F8C-4919-ACB4-332E378273DA}" type="datetimeFigureOut">
               <a:rPr lang="en-US" smtClean="0"/>
-              <a:t>10/29/2018</a:t>
+              <a:t>10/30/2018</a:t>
             </a:fld>
             <a:endParaRPr lang="en-US"/>
           </a:p>
@@ -1344,7 +1345,7 @@
           <a:p>
             <a:fld id="{1E1E479D-5F8C-4919-ACB4-332E378273DA}" type="datetimeFigureOut">
               <a:rPr lang="en-US" smtClean="0"/>
-              <a:t>10/29/2018</a:t>
+              <a:t>10/30/2018</a:t>
             </a:fld>
             <a:endParaRPr lang="en-US"/>
           </a:p>
@@ -1518,7 +1519,7 @@
           <a:p>
             <a:fld id="{1E1E479D-5F8C-4919-ACB4-332E378273DA}" type="datetimeFigureOut">
               <a:rPr lang="en-US" smtClean="0"/>
-              <a:t>10/29/2018</a:t>
+              <a:t>10/30/2018</a:t>
             </a:fld>
             <a:endParaRPr lang="en-US"/>
           </a:p>
@@ -1861,7 +1862,7 @@
           <a:p>
             <a:fld id="{1E1E479D-5F8C-4919-ACB4-332E378273DA}" type="datetimeFigureOut">
               <a:rPr lang="en-US" smtClean="0"/>
-              <a:t>10/29/2018</a:t>
+              <a:t>10/30/2018</a:t>
             </a:fld>
             <a:endParaRPr lang="en-US"/>
           </a:p>
@@ -2136,7 +2137,7 @@
           <a:p>
             <a:fld id="{1E1E479D-5F8C-4919-ACB4-332E378273DA}" type="datetimeFigureOut">
               <a:rPr lang="en-US" smtClean="0"/>
-              <a:t>10/29/2018</a:t>
+              <a:t>10/30/2018</a:t>
             </a:fld>
             <a:endParaRPr lang="en-US"/>
           </a:p>
@@ -2515,7 +2516,7 @@
           <a:p>
             <a:fld id="{1E1E479D-5F8C-4919-ACB4-332E378273DA}" type="datetimeFigureOut">
               <a:rPr lang="en-US" smtClean="0"/>
-              <a:t>10/29/2018</a:t>
+              <a:t>10/30/2018</a:t>
             </a:fld>
             <a:endParaRPr lang="en-US"/>
           </a:p>
@@ -2633,7 +2634,7 @@
           <a:p>
             <a:fld id="{1E1E479D-5F8C-4919-ACB4-332E378273DA}" type="datetimeFigureOut">
               <a:rPr lang="en-US" smtClean="0"/>
-              <a:t>10/29/2018</a:t>
+              <a:t>10/30/2018</a:t>
             </a:fld>
             <a:endParaRPr lang="en-US"/>
           </a:p>
@@ -2804,7 +2805,7 @@
           <a:p>
             <a:fld id="{1E1E479D-5F8C-4919-ACB4-332E378273DA}" type="datetimeFigureOut">
               <a:rPr lang="en-US" smtClean="0"/>
-              <a:t>10/29/2018</a:t>
+              <a:t>10/30/2018</a:t>
             </a:fld>
             <a:endParaRPr lang="en-US"/>
           </a:p>
@@ -3158,7 +3159,7 @@
           <a:p>
             <a:fld id="{1E1E479D-5F8C-4919-ACB4-332E378273DA}" type="datetimeFigureOut">
               <a:rPr lang="en-US" smtClean="0"/>
-              <a:t>10/29/2018</a:t>
+              <a:t>10/30/2018</a:t>
             </a:fld>
             <a:endParaRPr lang="en-US"/>
           </a:p>
@@ -3540,7 +3541,7 @@
           <a:p>
             <a:fld id="{1E1E479D-5F8C-4919-ACB4-332E378273DA}" type="datetimeFigureOut">
               <a:rPr lang="en-US" smtClean="0"/>
-              <a:t>10/29/2018</a:t>
+              <a:t>10/30/2018</a:t>
             </a:fld>
             <a:endParaRPr lang="en-US"/>
           </a:p>
@@ -3827,7 +3828,7 @@
           <a:p>
             <a:fld id="{1E1E479D-5F8C-4919-ACB4-332E378273DA}" type="datetimeFigureOut">
               <a:rPr lang="en-US" smtClean="0"/>
-              <a:t>10/29/2018</a:t>
+              <a:t>10/30/2018</a:t>
             </a:fld>
             <a:endParaRPr lang="en-US"/>
           </a:p>
@@ -4465,6 +4466,123 @@
           <a:p>
             <a:r>
               <a:rPr lang="en-US" dirty="0"/>
+              <a:t>Wine Variety Dashboard: Dropdown &amp; Metadata</a:t>
+            </a:r>
+          </a:p>
+        </p:txBody>
+      </p:sp>
+      <p:pic>
+        <p:nvPicPr>
+          <p:cNvPr id="3" name="Picture 2">
+            <a:extLst>
+              <a:ext uri="{FF2B5EF4-FFF2-40B4-BE49-F238E27FC236}">
+                <a16:creationId xmlns:a16="http://schemas.microsoft.com/office/drawing/2014/main" id="{F3F53CC4-D4AF-4C18-9186-E6FBC2F08179}"/>
+              </a:ext>
+            </a:extLst>
+          </p:cNvPr>
+          <p:cNvPicPr>
+            <a:picLocks noChangeAspect="1"/>
+          </p:cNvPicPr>
+          <p:nvPr/>
+        </p:nvPicPr>
+        <p:blipFill rotWithShape="1">
+          <a:blip r:embed="rId2"/>
+          <a:srcRect r="46371"/>
+          <a:stretch/>
+        </p:blipFill>
+        <p:spPr>
+          <a:xfrm>
+            <a:off x="1097280" y="2204719"/>
+            <a:ext cx="3759200" cy="3234821"/>
+          </a:xfrm>
+          <a:prstGeom prst="rect">
+            <a:avLst/>
+          </a:prstGeom>
+        </p:spPr>
+      </p:pic>
+      <p:pic>
+        <p:nvPicPr>
+          <p:cNvPr id="5" name="Picture 4">
+            <a:extLst>
+              <a:ext uri="{FF2B5EF4-FFF2-40B4-BE49-F238E27FC236}">
+                <a16:creationId xmlns:a16="http://schemas.microsoft.com/office/drawing/2014/main" id="{173AB8D5-EBD2-4445-A92E-B67ADCD0FEE1}"/>
+              </a:ext>
+            </a:extLst>
+          </p:cNvPr>
+          <p:cNvPicPr>
+            <a:picLocks noChangeAspect="1"/>
+          </p:cNvPicPr>
+          <p:nvPr/>
+        </p:nvPicPr>
+        <p:blipFill>
+          <a:blip r:embed="rId3"/>
+          <a:stretch>
+            <a:fillRect/>
+          </a:stretch>
+        </p:blipFill>
+        <p:spPr>
+          <a:xfrm>
+            <a:off x="6776720" y="2204719"/>
+            <a:ext cx="3610367" cy="3482340"/>
+          </a:xfrm>
+          <a:prstGeom prst="rect">
+            <a:avLst/>
+          </a:prstGeom>
+        </p:spPr>
+      </p:pic>
+    </p:spTree>
+    <p:extLst>
+      <p:ext uri="{BB962C8B-B14F-4D97-AF65-F5344CB8AC3E}">
+        <p14:creationId xmlns:p14="http://schemas.microsoft.com/office/powerpoint/2010/main" val="2604659254"/>
+      </p:ext>
+    </p:extLst>
+  </p:cSld>
+  <p:clrMapOvr>
+    <a:masterClrMapping/>
+  </p:clrMapOvr>
+</p:sld>
+</file>
+
+<file path=ppt/slides/slide11.xml><?xml version="1.0" encoding="utf-8"?>
+<p:sld xmlns:a="http://schemas.openxmlformats.org/drawingml/2006/main" xmlns:r="http://schemas.openxmlformats.org/officeDocument/2006/relationships" xmlns:p="http://schemas.openxmlformats.org/presentationml/2006/main">
+  <p:cSld>
+    <p:spTree>
+      <p:nvGrpSpPr>
+        <p:cNvPr id="1" name=""/>
+        <p:cNvGrpSpPr/>
+        <p:nvPr/>
+      </p:nvGrpSpPr>
+      <p:grpSpPr>
+        <a:xfrm>
+          <a:off x="0" y="0"/>
+          <a:ext cx="0" cy="0"/>
+          <a:chOff x="0" y="0"/>
+          <a:chExt cx="0" cy="0"/>
+        </a:xfrm>
+      </p:grpSpPr>
+      <p:sp>
+        <p:nvSpPr>
+          <p:cNvPr id="2" name="Title 1">
+            <a:extLst>
+              <a:ext uri="{FF2B5EF4-FFF2-40B4-BE49-F238E27FC236}">
+                <a16:creationId xmlns:a16="http://schemas.microsoft.com/office/drawing/2014/main" id="{0585AFDD-15A8-49BD-A991-AC342AB3A002}"/>
+              </a:ext>
+            </a:extLst>
+          </p:cNvPr>
+          <p:cNvSpPr>
+            <a:spLocks noGrp="1"/>
+          </p:cNvSpPr>
+          <p:nvPr>
+            <p:ph type="title"/>
+          </p:nvPr>
+        </p:nvSpPr>
+        <p:spPr/>
+        <p:txBody>
+          <a:bodyPr/>
+          <a:lstStyle/>
+          <a:p>
+            <a:r>
+              <a:rPr lang="en-US" dirty="0"/>
               <a:t>Wine Variety Dashboard: Country Production by Variety</a:t>
             </a:r>
           </a:p>
@@ -4513,7 +4631,7 @@
 </p:sld>
 </file>
 
-<file path=ppt/slides/slide11.xml><?xml version="1.0" encoding="utf-8"?>
+<file path=ppt/slides/slide12.xml><?xml version="1.0" encoding="utf-8"?>
 <p:sld xmlns:a="http://schemas.openxmlformats.org/drawingml/2006/main" xmlns:r="http://schemas.openxmlformats.org/officeDocument/2006/relationships" xmlns:p="http://schemas.openxmlformats.org/presentationml/2006/main">
   <p:cSld>
     <p:spTree>
@@ -5911,46 +6029,25 @@
           <a:p>
             <a:r>
               <a:rPr lang="en-US" dirty="0"/>
-              <a:t>Wine Variety Dashboard: Dropdown &amp; Metadata</a:t>
-            </a:r>
-          </a:p>
-        </p:txBody>
-      </p:sp>
-      <p:pic>
-        <p:nvPicPr>
-          <p:cNvPr id="3" name="Picture 2">
-            <a:extLst>
-              <a:ext uri="{FF2B5EF4-FFF2-40B4-BE49-F238E27FC236}">
-                <a16:creationId xmlns:a16="http://schemas.microsoft.com/office/drawing/2014/main" id="{F3F53CC4-D4AF-4C18-9186-E6FBC2F08179}"/>
-              </a:ext>
-            </a:extLst>
-          </p:cNvPr>
-          <p:cNvPicPr>
-            <a:picLocks noChangeAspect="1"/>
-          </p:cNvPicPr>
-          <p:nvPr/>
-        </p:nvPicPr>
-        <p:blipFill rotWithShape="1">
-          <a:blip r:embed="rId2"/>
-          <a:srcRect r="46371"/>
-          <a:stretch/>
-        </p:blipFill>
-        <p:spPr>
-          <a:xfrm>
-            <a:off x="1097280" y="2204719"/>
-            <a:ext cx="3759200" cy="3234821"/>
-          </a:xfrm>
-          <a:prstGeom prst="rect">
-            <a:avLst/>
-          </a:prstGeom>
-        </p:spPr>
-      </p:pic>
+              <a:t>Map with Winery Locations</a:t>
+            </a:r>
+            <a:br>
+              <a:rPr lang="en-US"/>
+            </a:br>
+            <a:r>
+              <a:rPr lang="en-US"/>
+              <a:t>(flag=winery)</a:t>
+            </a:r>
+            <a:endParaRPr lang="en-US" dirty="0"/>
+          </a:p>
+        </p:txBody>
+      </p:sp>
       <p:pic>
         <p:nvPicPr>
           <p:cNvPr id="5" name="Picture 4">
             <a:extLst>
               <a:ext uri="{FF2B5EF4-FFF2-40B4-BE49-F238E27FC236}">
-                <a16:creationId xmlns:a16="http://schemas.microsoft.com/office/drawing/2014/main" id="{173AB8D5-EBD2-4445-A92E-B67ADCD0FEE1}"/>
+                <a16:creationId xmlns:a16="http://schemas.microsoft.com/office/drawing/2014/main" id="{1151C6AD-1C79-4AD4-B987-E35A586D81B1}"/>
               </a:ext>
             </a:extLst>
           </p:cNvPr>
@@ -5960,15 +6057,21 @@
           <p:nvPr/>
         </p:nvPicPr>
         <p:blipFill>
-          <a:blip r:embed="rId3"/>
+          <a:blip r:embed="rId2">
+            <a:extLst>
+              <a:ext uri="{28A0092B-C50C-407E-A947-70E740481C1C}">
+                <a14:useLocalDpi xmlns:a14="http://schemas.microsoft.com/office/drawing/2010/main" val="0"/>
+              </a:ext>
+            </a:extLst>
+          </a:blip>
           <a:stretch>
             <a:fillRect/>
           </a:stretch>
         </p:blipFill>
         <p:spPr>
           <a:xfrm>
-            <a:off x="6776720" y="2204719"/>
-            <a:ext cx="3610367" cy="3482340"/>
+            <a:off x="2641600" y="2081348"/>
+            <a:ext cx="6969760" cy="3861149"/>
           </a:xfrm>
           <a:prstGeom prst="rect">
             <a:avLst/>
@@ -5978,7 +6081,7 @@
     </p:spTree>
     <p:extLst>
       <p:ext uri="{BB962C8B-B14F-4D97-AF65-F5344CB8AC3E}">
-        <p14:creationId xmlns:p14="http://schemas.microsoft.com/office/powerpoint/2010/main" val="2604659254"/>
+        <p14:creationId xmlns:p14="http://schemas.microsoft.com/office/powerpoint/2010/main" val="2160871131"/>
       </p:ext>
     </p:extLst>
   </p:cSld>

</xml_diff>